<commit_message>
Added histogram of h to the output of the lm.
</commit_message>
<xml_diff>
--- a/docs/illustrations/Trio.pptx
+++ b/docs/illustrations/Trio.pptx
@@ -2997,8 +2997,10 @@
               <a:alpha val="10000"/>
             </a:schemeClr>
           </a:solidFill>
-          <a:ln>
-            <a:noFill/>
+          <a:ln w="3175">
+            <a:solidFill>
+              <a:schemeClr val="tx1"/>
+            </a:solidFill>
           </a:ln>
         </p:spPr>
         <p:style>

</xml_diff>